<commit_message>
reordered unit 5, moved lessons to in-progress
</commit_message>
<xml_diff>
--- a/units/5/lessons/6/resources/petascale-lesson-5.6-slides.pptx
+++ b/units/5/lessons/6/resources/petascale-lesson-5.6-slides.pptx
@@ -7,16 +7,17 @@
   <p:sldIdLst>
     <p:sldId id="256" r:id="rId2"/>
     <p:sldId id="257" r:id="rId3"/>
-    <p:sldId id="258" r:id="rId4"/>
-    <p:sldId id="259" r:id="rId5"/>
-    <p:sldId id="268" r:id="rId6"/>
-    <p:sldId id="260" r:id="rId7"/>
-    <p:sldId id="261" r:id="rId8"/>
-    <p:sldId id="262" r:id="rId9"/>
-    <p:sldId id="269" r:id="rId10"/>
-    <p:sldId id="264" r:id="rId11"/>
-    <p:sldId id="265" r:id="rId12"/>
-    <p:sldId id="266" r:id="rId13"/>
+    <p:sldId id="259" r:id="rId4"/>
+    <p:sldId id="268" r:id="rId5"/>
+    <p:sldId id="260" r:id="rId6"/>
+    <p:sldId id="261" r:id="rId7"/>
+    <p:sldId id="262" r:id="rId8"/>
+    <p:sldId id="263" r:id="rId9"/>
+    <p:sldId id="271" r:id="rId10"/>
+    <p:sldId id="269" r:id="rId11"/>
+    <p:sldId id="264" r:id="rId12"/>
+    <p:sldId id="265" r:id="rId13"/>
+    <p:sldId id="266" r:id="rId14"/>
   </p:sldIdLst>
   <p:sldSz cx="12192000" cy="6858000"/>
   <p:notesSz cx="6858000" cy="9144000"/>
@@ -3360,7 +3361,7 @@
           <a:p>
             <a:r>
               <a:rPr lang="en-US" dirty="0"/>
-              <a:t>Advanced MPI (Message Passing Interface)</a:t>
+              <a:t>MPI (Message Passing Interface)</a:t>
             </a:r>
           </a:p>
         </p:txBody>
@@ -3425,7 +3426,7 @@
           <p:cNvPr id="2" name="Title 1">
             <a:extLst>
               <a:ext uri="{FF2B5EF4-FFF2-40B4-BE49-F238E27FC236}">
-                <a16:creationId xmlns:a16="http://schemas.microsoft.com/office/drawing/2014/main" id="{AE80C3E6-3CB2-4ED8-9B0C-4F06386CF520}"/>
+                <a16:creationId xmlns:a16="http://schemas.microsoft.com/office/drawing/2014/main" id="{D32A6C72-B983-4B94-ADD3-BB795A121028}"/>
               </a:ext>
             </a:extLst>
           </p:cNvPr>
@@ -3438,18 +3439,27 @@
         </p:nvSpPr>
         <p:spPr>
           <a:xfrm>
-            <a:off x="838200" y="240633"/>
-            <a:ext cx="10515600" cy="908635"/>
+            <a:off x="838200" y="126124"/>
+            <a:ext cx="10515600" cy="893380"/>
           </a:xfrm>
         </p:spPr>
         <p:txBody>
-          <a:bodyPr/>
+          <a:bodyPr>
+            <a:normAutofit fontScale="90000"/>
+          </a:bodyPr>
           <a:lstStyle/>
           <a:p>
             <a:pPr algn="ctr"/>
             <a:r>
               <a:rPr lang="en-US" dirty="0"/>
-              <a:t>Running Job Script</a:t>
+              <a:t>Steps to Use a Super Computer</a:t>
+            </a:r>
+            <a:br>
+              <a:rPr lang="en-US" dirty="0"/>
+            </a:br>
+            <a:r>
+              <a:rPr lang="en-US" dirty="0"/>
+              <a:t>(Example Template)</a:t>
             </a:r>
           </a:p>
         </p:txBody>
@@ -3459,7 +3469,7 @@
           <p:cNvPr id="3" name="Content Placeholder 2">
             <a:extLst>
               <a:ext uri="{FF2B5EF4-FFF2-40B4-BE49-F238E27FC236}">
-                <a16:creationId xmlns:a16="http://schemas.microsoft.com/office/drawing/2014/main" id="{95092379-FB2C-4EC8-9D9F-5B10DC6148C7}"/>
+                <a16:creationId xmlns:a16="http://schemas.microsoft.com/office/drawing/2014/main" id="{0D85C0FC-CC12-4F07-825A-916EEABAAD68}"/>
               </a:ext>
             </a:extLst>
           </p:cNvPr>
@@ -3472,8 +3482,8 @@
         </p:nvSpPr>
         <p:spPr>
           <a:xfrm>
-            <a:off x="838200" y="1272172"/>
-            <a:ext cx="10515600" cy="5008312"/>
+            <a:off x="838200" y="1439917"/>
+            <a:ext cx="10515600" cy="4737046"/>
           </a:xfrm>
           <a:ln>
             <a:solidFill>
@@ -3482,9 +3492,54 @@
           </a:ln>
         </p:spPr>
         <p:txBody>
-          <a:bodyPr/>
-          <a:lstStyle/>
-          <a:p>
+          <a:bodyPr>
+            <a:normAutofit fontScale="55000" lnSpcReduction="20000"/>
+          </a:bodyPr>
+          <a:lstStyle/>
+          <a:p>
+            <a:r>
+              <a:rPr lang="en-US" b="1" dirty="0" err="1"/>
+              <a:t>ssh</a:t>
+            </a:r>
+            <a:r>
+              <a:rPr lang="en-US" b="1" dirty="0"/>
+              <a:t> username@hostname.ncsa.illinois.edu&lt;ENTER&gt;</a:t>
+            </a:r>
+            <a:endParaRPr lang="en-US" dirty="0"/>
+          </a:p>
+          <a:p>
+            <a:endParaRPr lang="en-US" b="1" dirty="0"/>
+          </a:p>
+          <a:p>
+            <a:r>
+              <a:rPr lang="en-US" b="1" dirty="0"/>
+              <a:t>git clone \ https://github.com/aaronweeden/pi2018-submitting.git&lt;ENTER&gt;</a:t>
+            </a:r>
+            <a:endParaRPr lang="en-US" dirty="0"/>
+          </a:p>
+          <a:p>
+            <a:br>
+              <a:rPr lang="en-US" dirty="0"/>
+            </a:br>
+            <a:r>
+              <a:rPr lang="en-US" b="1" dirty="0"/>
+              <a:t>cd pi2018-submitting&lt;ENTER&gt;</a:t>
+            </a:r>
+          </a:p>
+          <a:p>
+            <a:br>
+              <a:rPr lang="pt-BR" dirty="0"/>
+            </a:br>
+            <a:r>
+              <a:rPr lang="pt-BR" b="1" dirty="0"/>
+              <a:t>cc -o test.exe test.c&lt;ENTER&gt;</a:t>
+            </a:r>
+            <a:endParaRPr lang="pt-BR" dirty="0"/>
+          </a:p>
+          <a:p>
+            <a:br>
+              <a:rPr lang="pt-BR" dirty="0"/>
+            </a:br>
             <a:r>
               <a:rPr lang="en-US" b="1" dirty="0"/>
               <a:t>cat </a:t>
@@ -3571,7 +3626,7 @@
     </p:spTree>
     <p:extLst>
       <p:ext uri="{BB962C8B-B14F-4D97-AF65-F5344CB8AC3E}">
-        <p14:creationId xmlns:p14="http://schemas.microsoft.com/office/powerpoint/2010/main" val="2908916810"/>
+        <p14:creationId xmlns:p14="http://schemas.microsoft.com/office/powerpoint/2010/main" val="3859322367"/>
       </p:ext>
     </p:extLst>
   </p:cSld>
@@ -3603,7 +3658,7 @@
           <p:cNvPr id="2" name="Title 1">
             <a:extLst>
               <a:ext uri="{FF2B5EF4-FFF2-40B4-BE49-F238E27FC236}">
-                <a16:creationId xmlns:a16="http://schemas.microsoft.com/office/drawing/2014/main" id="{3ADDC269-A440-4635-AF72-AB1C8BDD482C}"/>
+                <a16:creationId xmlns:a16="http://schemas.microsoft.com/office/drawing/2014/main" id="{AE80C3E6-3CB2-4ED8-9B0C-4F06386CF520}"/>
               </a:ext>
             </a:extLst>
           </p:cNvPr>
@@ -3616,8 +3671,8 @@
         </p:nvSpPr>
         <p:spPr>
           <a:xfrm>
-            <a:off x="838200" y="204534"/>
-            <a:ext cx="10515600" cy="806119"/>
+            <a:off x="838200" y="240633"/>
+            <a:ext cx="10515600" cy="908635"/>
           </a:xfrm>
         </p:spPr>
         <p:txBody>
@@ -3626,8 +3681,8 @@
           <a:p>
             <a:pPr algn="ctr"/>
             <a:r>
-              <a:rPr lang="en-US" b="1" dirty="0"/>
-              <a:t>Error and Output Files</a:t>
+              <a:rPr lang="en-US" dirty="0"/>
+              <a:t>Running Job Script</a:t>
             </a:r>
           </a:p>
         </p:txBody>
@@ -3637,7 +3692,7 @@
           <p:cNvPr id="3" name="Content Placeholder 2">
             <a:extLst>
               <a:ext uri="{FF2B5EF4-FFF2-40B4-BE49-F238E27FC236}">
-                <a16:creationId xmlns:a16="http://schemas.microsoft.com/office/drawing/2014/main" id="{4EE2F61E-5DBE-4680-9BD0-D5E6555851E1}"/>
+                <a16:creationId xmlns:a16="http://schemas.microsoft.com/office/drawing/2014/main" id="{95092379-FB2C-4EC8-9D9F-5B10DC6148C7}"/>
               </a:ext>
             </a:extLst>
           </p:cNvPr>
@@ -3650,8 +3705,8 @@
         </p:nvSpPr>
         <p:spPr>
           <a:xfrm>
-            <a:off x="838200" y="1010653"/>
-            <a:ext cx="10515600" cy="5642813"/>
+            <a:off x="838200" y="1272172"/>
+            <a:ext cx="10515600" cy="5008312"/>
           </a:xfrm>
           <a:ln>
             <a:solidFill>
@@ -3663,6 +3718,85 @@
           <a:bodyPr/>
           <a:lstStyle/>
           <a:p>
+            <a:r>
+              <a:rPr lang="en-US" b="1" dirty="0"/>
+              <a:t>cat </a:t>
+            </a:r>
+            <a:r>
+              <a:rPr lang="en-US" b="1" dirty="0" err="1"/>
+              <a:t>test.pbs</a:t>
+            </a:r>
+            <a:r>
+              <a:rPr lang="en-US" b="1" dirty="0"/>
+              <a:t>&lt;ENTER&gt;</a:t>
+            </a:r>
+            <a:endParaRPr lang="en-US" dirty="0"/>
+          </a:p>
+          <a:p>
+            <a:r>
+              <a:rPr lang="en-US" b="1" dirty="0"/>
+              <a:t>#!/bin/bash</a:t>
+            </a:r>
+            <a:endParaRPr lang="en-US" dirty="0"/>
+          </a:p>
+          <a:p>
+            <a:r>
+              <a:rPr lang="en-US" b="1" dirty="0"/>
+              <a:t>#PBS -l nodes=2:ppn=32:xe</a:t>
+            </a:r>
+            <a:endParaRPr lang="en-US" dirty="0"/>
+          </a:p>
+          <a:p>
+            <a:r>
+              <a:rPr lang="en-US" b="1" dirty="0"/>
+              <a:t>#PBS -l </a:t>
+            </a:r>
+            <a:r>
+              <a:rPr lang="en-US" b="1" dirty="0" err="1"/>
+              <a:t>walltime</a:t>
+            </a:r>
+            <a:r>
+              <a:rPr lang="en-US" b="1" dirty="0"/>
+              <a:t>=00:05:00</a:t>
+            </a:r>
+            <a:endParaRPr lang="en-US" dirty="0"/>
+          </a:p>
+          <a:p>
+            <a:r>
+              <a:rPr lang="en-US" b="1" dirty="0"/>
+              <a:t>#PBS -N test</a:t>
+            </a:r>
+            <a:endParaRPr lang="en-US" dirty="0"/>
+          </a:p>
+          <a:p>
+            <a:br>
+              <a:rPr lang="en-US" dirty="0"/>
+            </a:br>
+            <a:r>
+              <a:rPr lang="en-US" b="1" dirty="0"/>
+              <a:t>cd $PBS_O_WORKDIR</a:t>
+            </a:r>
+            <a:endParaRPr lang="en-US" dirty="0"/>
+          </a:p>
+          <a:p>
+            <a:br>
+              <a:rPr lang="en-US" dirty="0"/>
+            </a:br>
+            <a:r>
+              <a:rPr lang="en-US" b="1" dirty="0" err="1"/>
+              <a:t>aprun</a:t>
+            </a:r>
+            <a:r>
+              <a:rPr lang="en-US" b="1" dirty="0"/>
+              <a:t> -n 4 ./</a:t>
+            </a:r>
+            <a:r>
+              <a:rPr lang="en-US" b="1" dirty="0" err="1"/>
+              <a:t>test.exe|sort</a:t>
+            </a:r>
+            <a:endParaRPr lang="en-US" dirty="0"/>
+          </a:p>
+          <a:p>
             <a:endParaRPr lang="en-US" dirty="0"/>
           </a:p>
         </p:txBody>
@@ -3670,7 +3804,7 @@
     </p:spTree>
     <p:extLst>
       <p:ext uri="{BB962C8B-B14F-4D97-AF65-F5344CB8AC3E}">
-        <p14:creationId xmlns:p14="http://schemas.microsoft.com/office/powerpoint/2010/main" val="2846646130"/>
+        <p14:creationId xmlns:p14="http://schemas.microsoft.com/office/powerpoint/2010/main" val="2908916810"/>
       </p:ext>
     </p:extLst>
   </p:cSld>
@@ -3702,6 +3836,105 @@
           <p:cNvPr id="2" name="Title 1">
             <a:extLst>
               <a:ext uri="{FF2B5EF4-FFF2-40B4-BE49-F238E27FC236}">
+                <a16:creationId xmlns:a16="http://schemas.microsoft.com/office/drawing/2014/main" id="{3ADDC269-A440-4635-AF72-AB1C8BDD482C}"/>
+              </a:ext>
+            </a:extLst>
+          </p:cNvPr>
+          <p:cNvSpPr>
+            <a:spLocks noGrp="1"/>
+          </p:cNvSpPr>
+          <p:nvPr>
+            <p:ph type="title"/>
+          </p:nvPr>
+        </p:nvSpPr>
+        <p:spPr>
+          <a:xfrm>
+            <a:off x="838200" y="204534"/>
+            <a:ext cx="10515600" cy="806119"/>
+          </a:xfrm>
+        </p:spPr>
+        <p:txBody>
+          <a:bodyPr/>
+          <a:lstStyle/>
+          <a:p>
+            <a:pPr algn="ctr"/>
+            <a:r>
+              <a:rPr lang="en-US" b="1" dirty="0"/>
+              <a:t>Error and Output Files</a:t>
+            </a:r>
+          </a:p>
+        </p:txBody>
+      </p:sp>
+      <p:sp>
+        <p:nvSpPr>
+          <p:cNvPr id="3" name="Content Placeholder 2">
+            <a:extLst>
+              <a:ext uri="{FF2B5EF4-FFF2-40B4-BE49-F238E27FC236}">
+                <a16:creationId xmlns:a16="http://schemas.microsoft.com/office/drawing/2014/main" id="{4EE2F61E-5DBE-4680-9BD0-D5E6555851E1}"/>
+              </a:ext>
+            </a:extLst>
+          </p:cNvPr>
+          <p:cNvSpPr>
+            <a:spLocks noGrp="1"/>
+          </p:cNvSpPr>
+          <p:nvPr>
+            <p:ph idx="1"/>
+          </p:nvPr>
+        </p:nvSpPr>
+        <p:spPr>
+          <a:xfrm>
+            <a:off x="838200" y="1010653"/>
+            <a:ext cx="10515600" cy="5642813"/>
+          </a:xfrm>
+          <a:ln>
+            <a:solidFill>
+              <a:schemeClr val="accent1"/>
+            </a:solidFill>
+          </a:ln>
+        </p:spPr>
+        <p:txBody>
+          <a:bodyPr/>
+          <a:lstStyle/>
+          <a:p>
+            <a:endParaRPr lang="en-US" dirty="0"/>
+          </a:p>
+        </p:txBody>
+      </p:sp>
+    </p:spTree>
+    <p:extLst>
+      <p:ext uri="{BB962C8B-B14F-4D97-AF65-F5344CB8AC3E}">
+        <p14:creationId xmlns:p14="http://schemas.microsoft.com/office/powerpoint/2010/main" val="2846646130"/>
+      </p:ext>
+    </p:extLst>
+  </p:cSld>
+  <p:clrMapOvr>
+    <a:masterClrMapping/>
+  </p:clrMapOvr>
+</p:sld>
+</file>
+
+<file path=ppt/slides/slide13.xml><?xml version="1.0" encoding="utf-8"?>
+<p:sld xmlns:a="http://schemas.openxmlformats.org/drawingml/2006/main" xmlns:r="http://schemas.openxmlformats.org/officeDocument/2006/relationships" xmlns:p="http://schemas.openxmlformats.org/presentationml/2006/main">
+  <p:cSld>
+    <p:spTree>
+      <p:nvGrpSpPr>
+        <p:cNvPr id="1" name=""/>
+        <p:cNvGrpSpPr/>
+        <p:nvPr/>
+      </p:nvGrpSpPr>
+      <p:grpSpPr>
+        <a:xfrm>
+          <a:off x="0" y="0"/>
+          <a:ext cx="0" cy="0"/>
+          <a:chOff x="0" y="0"/>
+          <a:chExt cx="0" cy="0"/>
+        </a:xfrm>
+      </p:grpSpPr>
+      <p:sp>
+        <p:nvSpPr>
+          <p:cNvPr id="2" name="Title 1">
+            <a:extLst>
+              <a:ext uri="{FF2B5EF4-FFF2-40B4-BE49-F238E27FC236}">
                 <a16:creationId xmlns:a16="http://schemas.microsoft.com/office/drawing/2014/main" id="{CC1E18B4-3870-46BB-B73F-BF1140CB7690}"/>
               </a:ext>
             </a:extLst>
@@ -3796,7 +4029,7 @@
             </a:pPr>
             <a:r>
               <a:rPr lang="en-US" dirty="0"/>
-              <a:t>3. https://www.cs.usfca.edu/~peter/ipp/</a:t>
+              <a:t>3. https://www.mpi-forum.org/docs/mpi-1.1/mpi1-report.pdf</a:t>
             </a:r>
           </a:p>
         </p:txBody>
@@ -3901,7 +4134,7 @@
         </p:spPr>
         <p:txBody>
           <a:bodyPr>
-            <a:normAutofit fontScale="92500" lnSpcReduction="10000"/>
+            <a:normAutofit lnSpcReduction="10000"/>
           </a:bodyPr>
           <a:lstStyle/>
           <a:p>
@@ -3913,14 +4146,24 @@
           <a:p>
             <a:r>
               <a:rPr lang="en-US" dirty="0"/>
-              <a:t>General Form of MPI code</a:t>
-            </a:r>
-          </a:p>
-          <a:p>
-            <a:r>
-              <a:rPr lang="en-US" dirty="0"/>
-              <a:t>MPI Code for Complex Computation</a:t>
-            </a:r>
+              <a:t>Structure of MPI code</a:t>
+            </a:r>
+          </a:p>
+          <a:p>
+            <a:pPr lvl="1"/>
+            <a:r>
+              <a:rPr lang="en-US" dirty="0" err="1"/>
+              <a:t>Hello_world_mpi</a:t>
+            </a:r>
+            <a:endParaRPr lang="en-US" dirty="0"/>
+          </a:p>
+          <a:p>
+            <a:pPr lvl="1"/>
+            <a:r>
+              <a:rPr lang="en-US" dirty="0" err="1"/>
+              <a:t>Area_curve_mpi</a:t>
+            </a:r>
+            <a:endParaRPr lang="en-US" dirty="0"/>
           </a:p>
           <a:p>
             <a:r>
@@ -3950,7 +4193,7 @@
             <a:pPr lvl="1"/>
             <a:r>
               <a:rPr lang="en-US" dirty="0" err="1"/>
-              <a:t>Mpi_nbody_basic</a:t>
+              <a:t>Hello_world_mpi</a:t>
             </a:r>
             <a:endParaRPr lang="en-US" dirty="0"/>
           </a:p>
@@ -3958,23 +4201,18 @@
             <a:pPr lvl="1"/>
             <a:r>
               <a:rPr lang="en-US" dirty="0" err="1"/>
-              <a:t>Mpi_nbody_red</a:t>
-            </a:r>
-            <a:endParaRPr lang="en-US" dirty="0"/>
+              <a:t>Area_curve</a:t>
+            </a:r>
+            <a:r>
+              <a:rPr lang="en-US" dirty="0"/>
+              <a:t> code</a:t>
+            </a:r>
           </a:p>
           <a:p>
             <a:pPr lvl="1"/>
             <a:r>
               <a:rPr lang="en-US" dirty="0" err="1"/>
-              <a:t>Mpi_tsp_dyn</a:t>
-            </a:r>
-            <a:endParaRPr lang="en-US" dirty="0"/>
-          </a:p>
-          <a:p>
-            <a:pPr lvl="1"/>
-            <a:r>
-              <a:rPr lang="en-US" dirty="0" err="1"/>
-              <a:t>MPI_tsp_stat</a:t>
+              <a:t>BioFilm</a:t>
             </a:r>
             <a:endParaRPr lang="en-US" dirty="0"/>
           </a:p>
@@ -4049,7 +4287,7 @@
           <p:cNvPr id="2" name="Title 1">
             <a:extLst>
               <a:ext uri="{FF2B5EF4-FFF2-40B4-BE49-F238E27FC236}">
-                <a16:creationId xmlns:a16="http://schemas.microsoft.com/office/drawing/2014/main" id="{D26EB691-5275-468E-973C-417E71C7F468}"/>
+                <a16:creationId xmlns:a16="http://schemas.microsoft.com/office/drawing/2014/main" id="{78541851-D53B-4A1B-A2C8-7F4A29805040}"/>
               </a:ext>
             </a:extLst>
           </p:cNvPr>
@@ -4068,7 +4306,7 @@
             <a:pPr algn="ctr"/>
             <a:r>
               <a:rPr lang="en-US" dirty="0"/>
-              <a:t>Definition and Use</a:t>
+              <a:t>Structure of MPI code</a:t>
             </a:r>
           </a:p>
         </p:txBody>
@@ -4078,7 +4316,7 @@
           <p:cNvPr id="3" name="Content Placeholder 2">
             <a:extLst>
               <a:ext uri="{FF2B5EF4-FFF2-40B4-BE49-F238E27FC236}">
-                <a16:creationId xmlns:a16="http://schemas.microsoft.com/office/drawing/2014/main" id="{4164201B-B7E5-4559-86E9-5DF89D266323}"/>
+                <a16:creationId xmlns:a16="http://schemas.microsoft.com/office/drawing/2014/main" id="{5FCB070A-1B8B-4867-AD71-10DC47D3F977}"/>
               </a:ext>
             </a:extLst>
           </p:cNvPr>
@@ -4097,96 +4335,136 @@
           </a:ln>
         </p:spPr>
         <p:txBody>
-          <a:bodyPr>
-            <a:normAutofit fontScale="92500" lnSpcReduction="10000"/>
-          </a:bodyPr>
-          <a:lstStyle/>
-          <a:p>
-            <a:pPr marL="0" indent="0">
-              <a:buNone/>
-            </a:pPr>
-            <a:r>
-              <a:rPr lang="en-US" dirty="0"/>
-              <a:t>The main concepts of MPI are:</a:t>
-            </a:r>
-          </a:p>
-          <a:p>
-            <a:pPr marL="0" indent="0">
-              <a:buNone/>
-            </a:pPr>
-            <a:r>
-              <a:rPr lang="en-US" dirty="0"/>
-              <a:t>	. Used to create parallel SPMD programs on</a:t>
-            </a:r>
-          </a:p>
-          <a:p>
-            <a:pPr lvl="2"/>
-            <a:r>
-              <a:rPr lang="en-US" dirty="0"/>
-              <a:t>distributed-memory machines with explicit message passing</a:t>
-            </a:r>
-          </a:p>
-          <a:p>
-            <a:pPr marL="0" indent="0">
-              <a:buNone/>
-            </a:pPr>
-            <a:r>
-              <a:rPr lang="en-US" dirty="0"/>
-              <a:t>The Routines available for</a:t>
-            </a:r>
-          </a:p>
-          <a:p>
-            <a:pPr marL="0" indent="0">
-              <a:buNone/>
-            </a:pPr>
-            <a:r>
-              <a:rPr lang="en-US" dirty="0"/>
-              <a:t>	point-to-point communication</a:t>
-            </a:r>
-          </a:p>
-          <a:p>
-            <a:pPr marL="0" indent="0">
-              <a:buNone/>
-            </a:pPr>
-            <a:r>
-              <a:rPr lang="en-US" dirty="0"/>
-              <a:t> 	collective communication</a:t>
-            </a:r>
-          </a:p>
-          <a:p>
-            <a:pPr marL="0" indent="0">
-              <a:buNone/>
-            </a:pPr>
-            <a:r>
-              <a:rPr lang="en-US" dirty="0"/>
-              <a:t> 	1-to-many</a:t>
-            </a:r>
-          </a:p>
-          <a:p>
-            <a:pPr marL="0" indent="0">
-              <a:buNone/>
-            </a:pPr>
-            <a:r>
-              <a:rPr lang="en-US" dirty="0"/>
-              <a:t> 	many-to-1</a:t>
-            </a:r>
-          </a:p>
-          <a:p>
-            <a:pPr marL="0" indent="0">
-              <a:buNone/>
-            </a:pPr>
-            <a:r>
-              <a:rPr lang="en-US" dirty="0"/>
-              <a:t>	many-to-many</a:t>
-            </a:r>
-          </a:p>
-          <a:p>
-            <a:pPr marL="0" indent="0">
-              <a:buNone/>
-            </a:pPr>
-            <a:r>
-              <a:rPr lang="en-US" dirty="0"/>
-              <a:t>	synchronization</a:t>
+          <a:bodyPr/>
+          <a:lstStyle/>
+          <a:p>
+            <a:r>
+              <a:rPr lang="en-US" dirty="0"/>
+              <a:t>#include &lt;</a:t>
+            </a:r>
+            <a:r>
+              <a:rPr lang="en-US" dirty="0" err="1"/>
+              <a:t>mpi.h</a:t>
+            </a:r>
+            <a:r>
+              <a:rPr lang="en-US" dirty="0"/>
+              <a:t>&gt;</a:t>
+            </a:r>
+          </a:p>
+          <a:p>
+            <a:r>
+              <a:rPr lang="en-US" dirty="0"/>
+              <a:t>...</a:t>
+            </a:r>
+          </a:p>
+          <a:p>
+            <a:r>
+              <a:rPr lang="en-US" dirty="0" err="1"/>
+              <a:t>ierr</a:t>
+            </a:r>
+            <a:r>
+              <a:rPr lang="en-US" dirty="0"/>
+              <a:t>=</a:t>
+            </a:r>
+            <a:r>
+              <a:rPr lang="en-US" dirty="0" err="1"/>
+              <a:t>MPI_Init</a:t>
+            </a:r>
+            <a:r>
+              <a:rPr lang="en-US" dirty="0"/>
+              <a:t>(&amp;</a:t>
+            </a:r>
+            <a:r>
+              <a:rPr lang="en-US" dirty="0" err="1"/>
+              <a:t>argc</a:t>
+            </a:r>
+            <a:r>
+              <a:rPr lang="en-US" dirty="0"/>
+              <a:t>, &amp;</a:t>
+            </a:r>
+            <a:r>
+              <a:rPr lang="en-US" dirty="0" err="1"/>
+              <a:t>argv</a:t>
+            </a:r>
+            <a:r>
+              <a:rPr lang="en-US" dirty="0"/>
+              <a:t>);</a:t>
+            </a:r>
+          </a:p>
+          <a:p>
+            <a:r>
+              <a:rPr lang="en-US" dirty="0" err="1"/>
+              <a:t>ierr</a:t>
+            </a:r>
+            <a:r>
+              <a:rPr lang="en-US" dirty="0"/>
+              <a:t>=</a:t>
+            </a:r>
+            <a:r>
+              <a:rPr lang="en-US" dirty="0" err="1"/>
+              <a:t>MPI_Comm_size</a:t>
+            </a:r>
+            <a:r>
+              <a:rPr lang="en-US" dirty="0"/>
+              <a:t>(MPI_COMM_WORLD,&amp;</a:t>
+            </a:r>
+            <a:r>
+              <a:rPr lang="en-US" dirty="0" err="1"/>
+              <a:t>npes</a:t>
+            </a:r>
+            <a:r>
+              <a:rPr lang="en-US" dirty="0"/>
+              <a:t>);</a:t>
+            </a:r>
+          </a:p>
+          <a:p>
+            <a:r>
+              <a:rPr lang="en-US" dirty="0" err="1"/>
+              <a:t>ierr</a:t>
+            </a:r>
+            <a:r>
+              <a:rPr lang="en-US" dirty="0"/>
+              <a:t>=</a:t>
+            </a:r>
+            <a:r>
+              <a:rPr lang="en-US" dirty="0" err="1"/>
+              <a:t>MPI_Comm_rank</a:t>
+            </a:r>
+            <a:r>
+              <a:rPr lang="en-US" dirty="0"/>
+              <a:t>(MPI_COMM_WORLD,&amp;</a:t>
+            </a:r>
+            <a:r>
+              <a:rPr lang="en-US" dirty="0" err="1"/>
+              <a:t>iam</a:t>
+            </a:r>
+            <a:r>
+              <a:rPr lang="en-US" dirty="0"/>
+              <a:t>);</a:t>
+            </a:r>
+          </a:p>
+          <a:p>
+            <a:r>
+              <a:rPr lang="en-US" dirty="0"/>
+              <a:t>...</a:t>
+            </a:r>
+          </a:p>
+          <a:p>
+            <a:r>
+              <a:rPr lang="en-US" dirty="0" err="1"/>
+              <a:t>ierr</a:t>
+            </a:r>
+            <a:r>
+              <a:rPr lang="en-US" dirty="0"/>
+              <a:t>=</a:t>
+            </a:r>
+            <a:r>
+              <a:rPr lang="en-US" dirty="0" err="1"/>
+              <a:t>MPI_Finalize</a:t>
+            </a:r>
+            <a:r>
+              <a:rPr lang="en-US" dirty="0"/>
+              <a:t>();</a:t>
             </a:r>
           </a:p>
         </p:txBody>
@@ -4194,7 +4472,7 @@
     </p:spTree>
     <p:extLst>
       <p:ext uri="{BB962C8B-B14F-4D97-AF65-F5344CB8AC3E}">
-        <p14:creationId xmlns:p14="http://schemas.microsoft.com/office/powerpoint/2010/main" val="1015509238"/>
+        <p14:creationId xmlns:p14="http://schemas.microsoft.com/office/powerpoint/2010/main" val="1679195619"/>
       </p:ext>
     </p:extLst>
   </p:cSld>
@@ -4226,7 +4504,7 @@
           <p:cNvPr id="2" name="Title 1">
             <a:extLst>
               <a:ext uri="{FF2B5EF4-FFF2-40B4-BE49-F238E27FC236}">
-                <a16:creationId xmlns:a16="http://schemas.microsoft.com/office/drawing/2014/main" id="{78541851-D53B-4A1B-A2C8-7F4A29805040}"/>
+                <a16:creationId xmlns:a16="http://schemas.microsoft.com/office/drawing/2014/main" id="{459980E0-41DD-4D7D-8139-47A76AA72128}"/>
               </a:ext>
             </a:extLst>
           </p:cNvPr>
@@ -4245,7 +4523,7 @@
             <a:pPr algn="ctr"/>
             <a:r>
               <a:rPr lang="en-US" dirty="0"/>
-              <a:t>Structure of MPI code</a:t>
+              <a:t>Structure of MPI Code</a:t>
             </a:r>
           </a:p>
         </p:txBody>
@@ -4255,15 +4533,15 @@
           <p:cNvPr id="3" name="Content Placeholder 2">
             <a:extLst>
               <a:ext uri="{FF2B5EF4-FFF2-40B4-BE49-F238E27FC236}">
-                <a16:creationId xmlns:a16="http://schemas.microsoft.com/office/drawing/2014/main" id="{5FCB070A-1B8B-4867-AD71-10DC47D3F977}"/>
-              </a:ext>
-            </a:extLst>
-          </p:cNvPr>
-          <p:cNvSpPr>
-            <a:spLocks noGrp="1"/>
-          </p:cNvSpPr>
-          <p:nvPr>
-            <p:ph idx="1"/>
+                <a16:creationId xmlns:a16="http://schemas.microsoft.com/office/drawing/2014/main" id="{AE5427FF-0308-4C33-9572-0AC9E367B554}"/>
+              </a:ext>
+            </a:extLst>
+          </p:cNvPr>
+          <p:cNvSpPr>
+            <a:spLocks noGrp="1"/>
+          </p:cNvSpPr>
+          <p:nvPr>
+            <p:ph sz="half" idx="1"/>
           </p:nvPr>
         </p:nvSpPr>
         <p:spPr>
@@ -4279,6 +4557,58 @@
           <a:p>
             <a:r>
               <a:rPr lang="en-US" dirty="0"/>
+              <a:t>A parallel “Hello, World” program</a:t>
+            </a:r>
+          </a:p>
+          <a:p>
+            <a:r>
+              <a:rPr lang="en-US" dirty="0"/>
+              <a:t>– Initialize MPI</a:t>
+            </a:r>
+          </a:p>
+          <a:p>
+            <a:r>
+              <a:rPr lang="en-US" dirty="0"/>
+              <a:t>– Have each node print out its node number</a:t>
+            </a:r>
+          </a:p>
+          <a:p>
+            <a:r>
+              <a:rPr lang="en-US" dirty="0"/>
+              <a:t>– Quit MPI</a:t>
+            </a:r>
+          </a:p>
+        </p:txBody>
+      </p:sp>
+      <p:sp>
+        <p:nvSpPr>
+          <p:cNvPr id="4" name="Content Placeholder 3">
+            <a:extLst>
+              <a:ext uri="{FF2B5EF4-FFF2-40B4-BE49-F238E27FC236}">
+                <a16:creationId xmlns:a16="http://schemas.microsoft.com/office/drawing/2014/main" id="{5D23CE02-124F-4779-AB91-B70BA9FFF12A}"/>
+              </a:ext>
+            </a:extLst>
+          </p:cNvPr>
+          <p:cNvSpPr>
+            <a:spLocks noGrp="1"/>
+          </p:cNvSpPr>
+          <p:nvPr>
+            <p:ph sz="half" idx="2"/>
+          </p:nvPr>
+        </p:nvSpPr>
+        <p:spPr>
+          <a:ln>
+            <a:solidFill>
+              <a:schemeClr val="accent1"/>
+            </a:solidFill>
+          </a:ln>
+        </p:spPr>
+        <p:txBody>
+          <a:bodyPr/>
+          <a:lstStyle/>
+          <a:p>
+            <a:r>
+              <a:rPr lang="en-US" dirty="0"/>
               <a:t>#include &lt;</a:t>
             </a:r>
             <a:r>
@@ -4405,13 +4735,16 @@
               <a:rPr lang="en-US" dirty="0"/>
               <a:t>();</a:t>
             </a:r>
+          </a:p>
+          <a:p>
+            <a:endParaRPr lang="en-US" dirty="0"/>
           </a:p>
         </p:txBody>
       </p:sp>
     </p:spTree>
     <p:extLst>
       <p:ext uri="{BB962C8B-B14F-4D97-AF65-F5344CB8AC3E}">
-        <p14:creationId xmlns:p14="http://schemas.microsoft.com/office/powerpoint/2010/main" val="1679195619"/>
+        <p14:creationId xmlns:p14="http://schemas.microsoft.com/office/powerpoint/2010/main" val="1790736846"/>
       </p:ext>
     </p:extLst>
   </p:cSld>
@@ -4443,7 +4776,7 @@
           <p:cNvPr id="2" name="Title 1">
             <a:extLst>
               <a:ext uri="{FF2B5EF4-FFF2-40B4-BE49-F238E27FC236}">
-                <a16:creationId xmlns:a16="http://schemas.microsoft.com/office/drawing/2014/main" id="{459980E0-41DD-4D7D-8139-47A76AA72128}"/>
+                <a16:creationId xmlns:a16="http://schemas.microsoft.com/office/drawing/2014/main" id="{65FCCA58-5D8B-4F39-866E-D82DD4E365B2}"/>
               </a:ext>
             </a:extLst>
           </p:cNvPr>
@@ -4462,7 +4795,7 @@
             <a:pPr algn="ctr"/>
             <a:r>
               <a:rPr lang="en-US" dirty="0"/>
-              <a:t>Structure of MPI Code</a:t>
+              <a:t>Load the module (software application)</a:t>
             </a:r>
           </a:p>
         </p:txBody>
@@ -4472,15 +4805,15 @@
           <p:cNvPr id="3" name="Content Placeholder 2">
             <a:extLst>
               <a:ext uri="{FF2B5EF4-FFF2-40B4-BE49-F238E27FC236}">
-                <a16:creationId xmlns:a16="http://schemas.microsoft.com/office/drawing/2014/main" id="{AE5427FF-0308-4C33-9572-0AC9E367B554}"/>
-              </a:ext>
-            </a:extLst>
-          </p:cNvPr>
-          <p:cNvSpPr>
-            <a:spLocks noGrp="1"/>
-          </p:cNvSpPr>
-          <p:nvPr>
-            <p:ph sz="half" idx="1"/>
+                <a16:creationId xmlns:a16="http://schemas.microsoft.com/office/drawing/2014/main" id="{67CF6090-1791-478B-BAE5-F0025D20A785}"/>
+              </a:ext>
+            </a:extLst>
+          </p:cNvPr>
+          <p:cNvSpPr>
+            <a:spLocks noGrp="1"/>
+          </p:cNvSpPr>
+          <p:nvPr>
+            <p:ph idx="1"/>
           </p:nvPr>
         </p:nvSpPr>
         <p:spPr>
@@ -4496,186 +4829,42 @@
           <a:p>
             <a:r>
               <a:rPr lang="en-US" dirty="0"/>
-              <a:t>A parallel “Hello, World” program</a:t>
-            </a:r>
-          </a:p>
-          <a:p>
-            <a:r>
-              <a:rPr lang="en-US" dirty="0"/>
-              <a:t>– Initialize MPI</a:t>
-            </a:r>
-          </a:p>
-          <a:p>
-            <a:r>
-              <a:rPr lang="en-US" dirty="0"/>
-              <a:t>– Have each node print out its node number</a:t>
-            </a:r>
-          </a:p>
-          <a:p>
-            <a:r>
-              <a:rPr lang="en-US" dirty="0"/>
-              <a:t>– Quit MPI</a:t>
-            </a:r>
-          </a:p>
-        </p:txBody>
-      </p:sp>
-      <p:sp>
-        <p:nvSpPr>
-          <p:cNvPr id="4" name="Content Placeholder 3">
-            <a:extLst>
-              <a:ext uri="{FF2B5EF4-FFF2-40B4-BE49-F238E27FC236}">
-                <a16:creationId xmlns:a16="http://schemas.microsoft.com/office/drawing/2014/main" id="{5D23CE02-124F-4779-AB91-B70BA9FFF12A}"/>
-              </a:ext>
-            </a:extLst>
-          </p:cNvPr>
-          <p:cNvSpPr>
-            <a:spLocks noGrp="1"/>
-          </p:cNvSpPr>
-          <p:nvPr>
-            <p:ph sz="half" idx="2"/>
-          </p:nvPr>
-        </p:nvSpPr>
-        <p:spPr>
-          <a:ln>
-            <a:solidFill>
-              <a:schemeClr val="accent1"/>
-            </a:solidFill>
-          </a:ln>
-        </p:spPr>
-        <p:txBody>
-          <a:bodyPr/>
-          <a:lstStyle/>
-          <a:p>
-            <a:r>
-              <a:rPr lang="en-US" dirty="0"/>
-              <a:t>#include &lt;</a:t>
+              <a:t>module load </a:t>
             </a:r>
             <a:r>
               <a:rPr lang="en-US" dirty="0" err="1"/>
-              <a:t>mpi.h</a:t>
-            </a:r>
-            <a:r>
-              <a:rPr lang="en-US" dirty="0"/>
-              <a:t>&gt;</a:t>
-            </a:r>
-          </a:p>
-          <a:p>
-            <a:r>
-              <a:rPr lang="en-US" dirty="0"/>
-              <a:t>...</a:t>
-            </a:r>
+              <a:t>OpenMPI</a:t>
+            </a:r>
+            <a:endParaRPr lang="en-US" dirty="0"/>
           </a:p>
           <a:p>
             <a:r>
               <a:rPr lang="en-US" dirty="0" err="1"/>
-              <a:t>ierr</a:t>
-            </a:r>
-            <a:r>
-              <a:rPr lang="en-US" dirty="0"/>
-              <a:t>=</a:t>
+              <a:t>sbatch</a:t>
+            </a:r>
+            <a:r>
+              <a:rPr lang="en-US" dirty="0"/>
+              <a:t> </a:t>
             </a:r>
             <a:r>
               <a:rPr lang="en-US" dirty="0" err="1"/>
-              <a:t>MPI_Init</a:t>
-            </a:r>
-            <a:r>
-              <a:rPr lang="en-US" dirty="0"/>
-              <a:t>(&amp;</a:t>
-            </a:r>
+              <a:t>myJobScript</a:t>
+            </a:r>
+            <a:endParaRPr lang="en-US" dirty="0"/>
+          </a:p>
+          <a:p>
             <a:r>
               <a:rPr lang="en-US" dirty="0" err="1"/>
-              <a:t>argc</a:t>
-            </a:r>
-            <a:r>
-              <a:rPr lang="en-US" dirty="0"/>
-              <a:t>, &amp;</a:t>
+              <a:t>squeue</a:t>
+            </a:r>
+            <a:r>
+              <a:rPr lang="en-US" dirty="0"/>
+              <a:t> –u </a:t>
             </a:r>
             <a:r>
               <a:rPr lang="en-US" dirty="0" err="1"/>
-              <a:t>argv</a:t>
-            </a:r>
-            <a:r>
-              <a:rPr lang="en-US" dirty="0"/>
-              <a:t>);</a:t>
-            </a:r>
-          </a:p>
-          <a:p>
-            <a:r>
-              <a:rPr lang="en-US" dirty="0" err="1"/>
-              <a:t>ierr</a:t>
-            </a:r>
-            <a:r>
-              <a:rPr lang="en-US" dirty="0"/>
-              <a:t>=</a:t>
-            </a:r>
-            <a:r>
-              <a:rPr lang="en-US" dirty="0" err="1"/>
-              <a:t>MPI_Comm_size</a:t>
-            </a:r>
-            <a:r>
-              <a:rPr lang="en-US" dirty="0"/>
-              <a:t>(MPI_COMM_WORLD,&amp;</a:t>
-            </a:r>
-            <a:r>
-              <a:rPr lang="en-US" dirty="0" err="1"/>
-              <a:t>npes</a:t>
-            </a:r>
-            <a:r>
-              <a:rPr lang="en-US" dirty="0"/>
-              <a:t>);</a:t>
-            </a:r>
-          </a:p>
-          <a:p>
-            <a:r>
-              <a:rPr lang="en-US" dirty="0" err="1"/>
-              <a:t>ierr</a:t>
-            </a:r>
-            <a:r>
-              <a:rPr lang="en-US" dirty="0"/>
-              <a:t>=</a:t>
-            </a:r>
-            <a:r>
-              <a:rPr lang="en-US" dirty="0" err="1"/>
-              <a:t>MPI_Comm_rank</a:t>
-            </a:r>
-            <a:r>
-              <a:rPr lang="en-US" dirty="0"/>
-              <a:t>(MPI_COMM_WORLD,&amp;</a:t>
-            </a:r>
-            <a:r>
-              <a:rPr lang="en-US" dirty="0" err="1"/>
-              <a:t>iam</a:t>
-            </a:r>
-            <a:r>
-              <a:rPr lang="en-US" dirty="0"/>
-              <a:t>);</a:t>
-            </a:r>
-          </a:p>
-          <a:p>
-            <a:r>
-              <a:rPr lang="en-US" dirty="0"/>
-              <a:t>...</a:t>
-            </a:r>
-          </a:p>
-          <a:p>
-            <a:r>
-              <a:rPr lang="en-US" dirty="0" err="1"/>
-              <a:t>ierr</a:t>
-            </a:r>
-            <a:r>
-              <a:rPr lang="en-US" dirty="0"/>
-              <a:t>=</a:t>
-            </a:r>
-            <a:r>
-              <a:rPr lang="en-US" dirty="0" err="1"/>
-              <a:t>MPI_Finalize</a:t>
-            </a:r>
-            <a:r>
-              <a:rPr lang="en-US" dirty="0"/>
-              <a:t>();</a:t>
-            </a:r>
-          </a:p>
-          <a:p>
+              <a:t>haboudj</a:t>
+            </a:r>
             <a:endParaRPr lang="en-US" dirty="0"/>
           </a:p>
         </p:txBody>
@@ -4683,7 +4872,7 @@
     </p:spTree>
     <p:extLst>
       <p:ext uri="{BB962C8B-B14F-4D97-AF65-F5344CB8AC3E}">
-        <p14:creationId xmlns:p14="http://schemas.microsoft.com/office/powerpoint/2010/main" val="1790736846"/>
+        <p14:creationId xmlns:p14="http://schemas.microsoft.com/office/powerpoint/2010/main" val="2616949819"/>
       </p:ext>
     </p:extLst>
   </p:cSld>
@@ -4715,7 +4904,7 @@
           <p:cNvPr id="2" name="Title 1">
             <a:extLst>
               <a:ext uri="{FF2B5EF4-FFF2-40B4-BE49-F238E27FC236}">
-                <a16:creationId xmlns:a16="http://schemas.microsoft.com/office/drawing/2014/main" id="{65FCCA58-5D8B-4F39-866E-D82DD4E365B2}"/>
+                <a16:creationId xmlns:a16="http://schemas.microsoft.com/office/drawing/2014/main" id="{C51CA24E-2C2B-48C0-8798-158C4AF426F2}"/>
               </a:ext>
             </a:extLst>
           </p:cNvPr>
@@ -4726,15 +4915,20 @@
             <p:ph type="title"/>
           </p:nvPr>
         </p:nvSpPr>
-        <p:spPr/>
+        <p:spPr>
+          <a:xfrm>
+            <a:off x="838200" y="84084"/>
+            <a:ext cx="10515600" cy="725214"/>
+          </a:xfrm>
+        </p:spPr>
         <p:txBody>
           <a:bodyPr/>
           <a:lstStyle/>
           <a:p>
             <a:pPr algn="ctr"/>
             <a:r>
-              <a:rPr lang="en-US" dirty="0"/>
-              <a:t>Load the module (software application)</a:t>
+              <a:rPr lang="en-US" b="1" dirty="0"/>
+              <a:t>Job Script Code (SLURM)</a:t>
             </a:r>
           </a:p>
         </p:txBody>
@@ -4744,7 +4938,7 @@
           <p:cNvPr id="3" name="Content Placeholder 2">
             <a:extLst>
               <a:ext uri="{FF2B5EF4-FFF2-40B4-BE49-F238E27FC236}">
-                <a16:creationId xmlns:a16="http://schemas.microsoft.com/office/drawing/2014/main" id="{67CF6090-1791-478B-BAE5-F0025D20A785}"/>
+                <a16:creationId xmlns:a16="http://schemas.microsoft.com/office/drawing/2014/main" id="{CC8128EF-CE27-4C2C-BE08-4F24065E3AEE}"/>
               </a:ext>
             </a:extLst>
           </p:cNvPr>
@@ -4756,6 +4950,10 @@
           </p:nvPr>
         </p:nvSpPr>
         <p:spPr>
+          <a:xfrm>
+            <a:off x="838200" y="809298"/>
+            <a:ext cx="10515600" cy="5747913"/>
+          </a:xfrm>
           <a:ln>
             <a:solidFill>
               <a:schemeClr val="accent1"/>
@@ -4766,44 +4964,6 @@
           <a:bodyPr/>
           <a:lstStyle/>
           <a:p>
-            <a:r>
-              <a:rPr lang="en-US" dirty="0"/>
-              <a:t>module load </a:t>
-            </a:r>
-            <a:r>
-              <a:rPr lang="en-US" dirty="0" err="1"/>
-              <a:t>OpenMPI</a:t>
-            </a:r>
-            <a:endParaRPr lang="en-US" dirty="0"/>
-          </a:p>
-          <a:p>
-            <a:r>
-              <a:rPr lang="en-US" dirty="0" err="1"/>
-              <a:t>sbatch</a:t>
-            </a:r>
-            <a:r>
-              <a:rPr lang="en-US" dirty="0"/>
-              <a:t> </a:t>
-            </a:r>
-            <a:r>
-              <a:rPr lang="en-US" dirty="0" err="1"/>
-              <a:t>myJobScript</a:t>
-            </a:r>
-            <a:endParaRPr lang="en-US" dirty="0"/>
-          </a:p>
-          <a:p>
-            <a:r>
-              <a:rPr lang="en-US" dirty="0" err="1"/>
-              <a:t>squeue</a:t>
-            </a:r>
-            <a:r>
-              <a:rPr lang="en-US" dirty="0"/>
-              <a:t> –u </a:t>
-            </a:r>
-            <a:r>
-              <a:rPr lang="en-US" dirty="0" err="1"/>
-              <a:t>haboudj</a:t>
-            </a:r>
             <a:endParaRPr lang="en-US" dirty="0"/>
           </a:p>
         </p:txBody>
@@ -4811,7 +4971,7 @@
     </p:spTree>
     <p:extLst>
       <p:ext uri="{BB962C8B-B14F-4D97-AF65-F5344CB8AC3E}">
-        <p14:creationId xmlns:p14="http://schemas.microsoft.com/office/powerpoint/2010/main" val="2616949819"/>
+        <p14:creationId xmlns:p14="http://schemas.microsoft.com/office/powerpoint/2010/main" val="1408116969"/>
       </p:ext>
     </p:extLst>
   </p:cSld>
@@ -4843,7 +5003,7 @@
           <p:cNvPr id="2" name="Title 1">
             <a:extLst>
               <a:ext uri="{FF2B5EF4-FFF2-40B4-BE49-F238E27FC236}">
-                <a16:creationId xmlns:a16="http://schemas.microsoft.com/office/drawing/2014/main" id="{C51CA24E-2C2B-48C0-8798-158C4AF426F2}"/>
+                <a16:creationId xmlns:a16="http://schemas.microsoft.com/office/drawing/2014/main" id="{2E03BF64-74FE-405F-8649-C7E0E8C8083E}"/>
               </a:ext>
             </a:extLst>
           </p:cNvPr>
@@ -4856,8 +5016,8 @@
         </p:nvSpPr>
         <p:spPr>
           <a:xfrm>
-            <a:off x="838200" y="84084"/>
-            <a:ext cx="10515600" cy="725214"/>
+            <a:off x="838200" y="96253"/>
+            <a:ext cx="10515600" cy="782048"/>
           </a:xfrm>
         </p:spPr>
         <p:txBody>
@@ -4867,7 +5027,7 @@
             <a:pPr algn="ctr"/>
             <a:r>
               <a:rPr lang="en-US" b="1" dirty="0"/>
-              <a:t>Job Script Code (SLURM)</a:t>
+              <a:t>Run the job script</a:t>
             </a:r>
           </a:p>
         </p:txBody>
@@ -4877,7 +5037,7 @@
           <p:cNvPr id="3" name="Content Placeholder 2">
             <a:extLst>
               <a:ext uri="{FF2B5EF4-FFF2-40B4-BE49-F238E27FC236}">
-                <a16:creationId xmlns:a16="http://schemas.microsoft.com/office/drawing/2014/main" id="{CC8128EF-CE27-4C2C-BE08-4F24065E3AEE}"/>
+                <a16:creationId xmlns:a16="http://schemas.microsoft.com/office/drawing/2014/main" id="{46B2A218-3137-42AB-986E-0869013D3A74}"/>
               </a:ext>
             </a:extLst>
           </p:cNvPr>
@@ -4890,8 +5050,8 @@
         </p:nvSpPr>
         <p:spPr>
           <a:xfrm>
-            <a:off x="838200" y="809298"/>
-            <a:ext cx="10515600" cy="5747913"/>
+            <a:off x="838200" y="1010653"/>
+            <a:ext cx="10515600" cy="5166310"/>
           </a:xfrm>
           <a:ln>
             <a:solidFill>
@@ -4910,7 +5070,7 @@
     </p:spTree>
     <p:extLst>
       <p:ext uri="{BB962C8B-B14F-4D97-AF65-F5344CB8AC3E}">
-        <p14:creationId xmlns:p14="http://schemas.microsoft.com/office/powerpoint/2010/main" val="1408116969"/>
+        <p14:creationId xmlns:p14="http://schemas.microsoft.com/office/powerpoint/2010/main" val="32614491"/>
       </p:ext>
     </p:extLst>
   </p:cSld>
@@ -4942,7 +5102,7 @@
           <p:cNvPr id="2" name="Title 1">
             <a:extLst>
               <a:ext uri="{FF2B5EF4-FFF2-40B4-BE49-F238E27FC236}">
-                <a16:creationId xmlns:a16="http://schemas.microsoft.com/office/drawing/2014/main" id="{2E03BF64-74FE-405F-8649-C7E0E8C8083E}"/>
+                <a16:creationId xmlns:a16="http://schemas.microsoft.com/office/drawing/2014/main" id="{CCC10C42-C8AC-4BD6-991C-96C9A2C0B3C2}"/>
               </a:ext>
             </a:extLst>
           </p:cNvPr>
@@ -4955,42 +5115,56 @@
         </p:nvSpPr>
         <p:spPr>
           <a:xfrm>
-            <a:off x="838200" y="96253"/>
-            <a:ext cx="10515600" cy="782048"/>
+            <a:off x="838200" y="132348"/>
+            <a:ext cx="10515600" cy="866274"/>
           </a:xfrm>
         </p:spPr>
         <p:txBody>
-          <a:bodyPr/>
+          <a:bodyPr>
+            <a:normAutofit/>
+          </a:bodyPr>
           <a:lstStyle/>
           <a:p>
             <a:pPr algn="ctr"/>
             <a:r>
               <a:rPr lang="en-US" b="1" dirty="0"/>
-              <a:t>Run the job script</a:t>
-            </a:r>
-          </a:p>
-        </p:txBody>
-      </p:sp>
-      <p:sp>
-        <p:nvSpPr>
-          <p:cNvPr id="3" name="Content Placeholder 2">
-            <a:extLst>
-              <a:ext uri="{FF2B5EF4-FFF2-40B4-BE49-F238E27FC236}">
-                <a16:creationId xmlns:a16="http://schemas.microsoft.com/office/drawing/2014/main" id="{46B2A218-3137-42AB-986E-0869013D3A74}"/>
-              </a:ext>
-            </a:extLst>
-          </p:cNvPr>
-          <p:cNvSpPr>
-            <a:spLocks noGrp="1"/>
-          </p:cNvSpPr>
+              <a:t>Screenshots of example of program codes run</a:t>
+            </a:r>
+          </a:p>
+        </p:txBody>
+      </p:sp>
+      <p:pic>
+        <p:nvPicPr>
+          <p:cNvPr id="5" name="Content Placeholder 4" descr="A screen shot of a computer&#10;&#10;Description automatically generated">
+            <a:extLst>
+              <a:ext uri="{FF2B5EF4-FFF2-40B4-BE49-F238E27FC236}">
+                <a16:creationId xmlns:a16="http://schemas.microsoft.com/office/drawing/2014/main" id="{DCADDCFA-2886-4B5F-BA5C-CCB8763C8EEE}"/>
+              </a:ext>
+            </a:extLst>
+          </p:cNvPr>
+          <p:cNvPicPr>
+            <a:picLocks noGrp="1" noChangeAspect="1"/>
+          </p:cNvPicPr>
           <p:nvPr>
             <p:ph idx="1"/>
           </p:nvPr>
-        </p:nvSpPr>
+        </p:nvPicPr>
+        <p:blipFill>
+          <a:blip r:embed="rId2">
+            <a:extLst>
+              <a:ext uri="{28A0092B-C50C-407E-A947-70E740481C1C}">
+                <a14:useLocalDpi xmlns:a14="http://schemas.microsoft.com/office/drawing/2010/main" val="0"/>
+              </a:ext>
+            </a:extLst>
+          </a:blip>
+          <a:stretch>
+            <a:fillRect/>
+          </a:stretch>
+        </p:blipFill>
         <p:spPr>
           <a:xfrm>
-            <a:off x="838200" y="1010653"/>
-            <a:ext cx="10515600" cy="5166310"/>
+            <a:off x="1492956" y="998538"/>
+            <a:ext cx="9206088" cy="5178425"/>
           </a:xfrm>
           <a:ln>
             <a:solidFill>
@@ -4998,18 +5172,11 @@
             </a:solidFill>
           </a:ln>
         </p:spPr>
-        <p:txBody>
-          <a:bodyPr/>
-          <a:lstStyle/>
-          <a:p>
-            <a:endParaRPr lang="en-US" dirty="0"/>
-          </a:p>
-        </p:txBody>
-      </p:sp>
+      </p:pic>
     </p:spTree>
     <p:extLst>
       <p:ext uri="{BB962C8B-B14F-4D97-AF65-F5344CB8AC3E}">
-        <p14:creationId xmlns:p14="http://schemas.microsoft.com/office/powerpoint/2010/main" val="32614491"/>
+        <p14:creationId xmlns:p14="http://schemas.microsoft.com/office/powerpoint/2010/main" val="1906523159"/>
       </p:ext>
     </p:extLst>
   </p:cSld>
@@ -5041,7 +5208,7 @@
           <p:cNvPr id="2" name="Title 1">
             <a:extLst>
               <a:ext uri="{FF2B5EF4-FFF2-40B4-BE49-F238E27FC236}">
-                <a16:creationId xmlns:a16="http://schemas.microsoft.com/office/drawing/2014/main" id="{D32A6C72-B983-4B94-ADD3-BB795A121028}"/>
+                <a16:creationId xmlns:a16="http://schemas.microsoft.com/office/drawing/2014/main" id="{13C59F16-4AB5-4C02-9F90-25F25CBFA6B3}"/>
               </a:ext>
             </a:extLst>
           </p:cNvPr>
@@ -5052,196 +5219,89 @@
             <p:ph type="title"/>
           </p:nvPr>
         </p:nvSpPr>
+        <p:spPr/>
+        <p:txBody>
+          <a:bodyPr/>
+          <a:lstStyle/>
+          <a:p>
+            <a:endParaRPr lang="en-US"/>
+          </a:p>
+        </p:txBody>
+      </p:sp>
+      <p:pic>
+        <p:nvPicPr>
+          <p:cNvPr id="6" name="Content Placeholder 5" descr="A screen shot of a computer&#10;&#10;Description automatically generated">
+            <a:extLst>
+              <a:ext uri="{FF2B5EF4-FFF2-40B4-BE49-F238E27FC236}">
+                <a16:creationId xmlns:a16="http://schemas.microsoft.com/office/drawing/2014/main" id="{A3C3DD11-0F16-44C1-A74E-D34D2557E236}"/>
+              </a:ext>
+            </a:extLst>
+          </p:cNvPr>
+          <p:cNvPicPr>
+            <a:picLocks noGrp="1" noChangeAspect="1"/>
+          </p:cNvPicPr>
+          <p:nvPr>
+            <p:ph sz="half" idx="1"/>
+          </p:nvPr>
+        </p:nvPicPr>
+        <p:blipFill>
+          <a:blip r:embed="rId2">
+            <a:extLst>
+              <a:ext uri="{28A0092B-C50C-407E-A947-70E740481C1C}">
+                <a14:useLocalDpi xmlns:a14="http://schemas.microsoft.com/office/drawing/2010/main" val="0"/>
+              </a:ext>
+            </a:extLst>
+          </a:blip>
+          <a:stretch>
+            <a:fillRect/>
+          </a:stretch>
+        </p:blipFill>
         <p:spPr>
           <a:xfrm>
-            <a:off x="838200" y="126124"/>
-            <a:ext cx="10515600" cy="893380"/>
+            <a:off x="838200" y="2543969"/>
+            <a:ext cx="5181600" cy="2914650"/>
           </a:xfrm>
         </p:spPr>
-        <p:txBody>
-          <a:bodyPr>
-            <a:normAutofit fontScale="90000"/>
-          </a:bodyPr>
-          <a:lstStyle/>
-          <a:p>
-            <a:pPr algn="ctr"/>
-            <a:r>
-              <a:rPr lang="en-US" dirty="0"/>
-              <a:t>Steps to Use a Super Computer</a:t>
-            </a:r>
-            <a:br>
-              <a:rPr lang="en-US" dirty="0"/>
-            </a:br>
-            <a:r>
-              <a:rPr lang="en-US" dirty="0"/>
-              <a:t>(Example Template)</a:t>
-            </a:r>
-          </a:p>
-        </p:txBody>
-      </p:sp>
-      <p:sp>
-        <p:nvSpPr>
-          <p:cNvPr id="3" name="Content Placeholder 2">
-            <a:extLst>
-              <a:ext uri="{FF2B5EF4-FFF2-40B4-BE49-F238E27FC236}">
-                <a16:creationId xmlns:a16="http://schemas.microsoft.com/office/drawing/2014/main" id="{0D85C0FC-CC12-4F07-825A-916EEABAAD68}"/>
-              </a:ext>
-            </a:extLst>
-          </p:cNvPr>
-          <p:cNvSpPr>
-            <a:spLocks noGrp="1"/>
-          </p:cNvSpPr>
-          <p:nvPr>
-            <p:ph idx="1"/>
-          </p:nvPr>
-        </p:nvSpPr>
+      </p:pic>
+      <p:pic>
+        <p:nvPicPr>
+          <p:cNvPr id="10" name="Content Placeholder 9" descr="A screenshot of a computer&#10;&#10;Description automatically generated">
+            <a:extLst>
+              <a:ext uri="{FF2B5EF4-FFF2-40B4-BE49-F238E27FC236}">
+                <a16:creationId xmlns:a16="http://schemas.microsoft.com/office/drawing/2014/main" id="{6AF91661-D465-4E8E-86BF-8F3258BB4041}"/>
+              </a:ext>
+            </a:extLst>
+          </p:cNvPr>
+          <p:cNvPicPr>
+            <a:picLocks noGrp="1" noChangeAspect="1"/>
+          </p:cNvPicPr>
+          <p:nvPr>
+            <p:ph sz="half" idx="2"/>
+          </p:nvPr>
+        </p:nvPicPr>
+        <p:blipFill>
+          <a:blip r:embed="rId3">
+            <a:extLst>
+              <a:ext uri="{28A0092B-C50C-407E-A947-70E740481C1C}">
+                <a14:useLocalDpi xmlns:a14="http://schemas.microsoft.com/office/drawing/2010/main" val="0"/>
+              </a:ext>
+            </a:extLst>
+          </a:blip>
+          <a:stretch>
+            <a:fillRect/>
+          </a:stretch>
+        </p:blipFill>
         <p:spPr>
           <a:xfrm>
-            <a:off x="838200" y="1439917"/>
-            <a:ext cx="10515600" cy="4737046"/>
+            <a:off x="6172200" y="2543969"/>
+            <a:ext cx="5181600" cy="2914650"/>
           </a:xfrm>
-          <a:ln>
-            <a:solidFill>
-              <a:schemeClr val="accent1"/>
-            </a:solidFill>
-          </a:ln>
         </p:spPr>
-        <p:txBody>
-          <a:bodyPr>
-            <a:normAutofit fontScale="55000" lnSpcReduction="20000"/>
-          </a:bodyPr>
-          <a:lstStyle/>
-          <a:p>
-            <a:r>
-              <a:rPr lang="en-US" b="1" dirty="0" err="1"/>
-              <a:t>ssh</a:t>
-            </a:r>
-            <a:r>
-              <a:rPr lang="en-US" b="1" dirty="0"/>
-              <a:t> username@hostname.ncsa.illinois.edu&lt;ENTER&gt;</a:t>
-            </a:r>
-            <a:endParaRPr lang="en-US" dirty="0"/>
-          </a:p>
-          <a:p>
-            <a:endParaRPr lang="en-US" b="1" dirty="0"/>
-          </a:p>
-          <a:p>
-            <a:r>
-              <a:rPr lang="en-US" b="1" dirty="0"/>
-              <a:t>git clone \ https://github.com/aaronweeden/pi2018-submitting.git&lt;ENTER&gt;</a:t>
-            </a:r>
-            <a:endParaRPr lang="en-US" dirty="0"/>
-          </a:p>
-          <a:p>
-            <a:br>
-              <a:rPr lang="en-US" dirty="0"/>
-            </a:br>
-            <a:r>
-              <a:rPr lang="en-US" b="1" dirty="0"/>
-              <a:t>cd pi2018-submitting&lt;ENTER&gt;</a:t>
-            </a:r>
-          </a:p>
-          <a:p>
-            <a:br>
-              <a:rPr lang="pt-BR" dirty="0"/>
-            </a:br>
-            <a:r>
-              <a:rPr lang="pt-BR" b="1" dirty="0"/>
-              <a:t>cc -o test.exe test.c&lt;ENTER&gt;</a:t>
-            </a:r>
-            <a:endParaRPr lang="pt-BR" dirty="0"/>
-          </a:p>
-          <a:p>
-            <a:br>
-              <a:rPr lang="pt-BR" dirty="0"/>
-            </a:br>
-            <a:r>
-              <a:rPr lang="en-US" b="1" dirty="0"/>
-              <a:t>cat </a:t>
-            </a:r>
-            <a:r>
-              <a:rPr lang="en-US" b="1" dirty="0" err="1"/>
-              <a:t>test.pbs</a:t>
-            </a:r>
-            <a:r>
-              <a:rPr lang="en-US" b="1" dirty="0"/>
-              <a:t>&lt;ENTER&gt;</a:t>
-            </a:r>
-            <a:endParaRPr lang="en-US" dirty="0"/>
-          </a:p>
-          <a:p>
-            <a:r>
-              <a:rPr lang="en-US" b="1" dirty="0"/>
-              <a:t>#!/bin/bash</a:t>
-            </a:r>
-            <a:endParaRPr lang="en-US" dirty="0"/>
-          </a:p>
-          <a:p>
-            <a:r>
-              <a:rPr lang="en-US" b="1" dirty="0"/>
-              <a:t>#PBS -l nodes=2:ppn=32:xe</a:t>
-            </a:r>
-            <a:endParaRPr lang="en-US" dirty="0"/>
-          </a:p>
-          <a:p>
-            <a:r>
-              <a:rPr lang="en-US" b="1" dirty="0"/>
-              <a:t>#PBS -l </a:t>
-            </a:r>
-            <a:r>
-              <a:rPr lang="en-US" b="1" dirty="0" err="1"/>
-              <a:t>walltime</a:t>
-            </a:r>
-            <a:r>
-              <a:rPr lang="en-US" b="1" dirty="0"/>
-              <a:t>=00:05:00</a:t>
-            </a:r>
-            <a:endParaRPr lang="en-US" dirty="0"/>
-          </a:p>
-          <a:p>
-            <a:r>
-              <a:rPr lang="en-US" b="1" dirty="0"/>
-              <a:t>#PBS -N test</a:t>
-            </a:r>
-            <a:endParaRPr lang="en-US" dirty="0"/>
-          </a:p>
-          <a:p>
-            <a:br>
-              <a:rPr lang="en-US" dirty="0"/>
-            </a:br>
-            <a:r>
-              <a:rPr lang="en-US" b="1" dirty="0"/>
-              <a:t>cd $PBS_O_WORKDIR</a:t>
-            </a:r>
-            <a:endParaRPr lang="en-US" dirty="0"/>
-          </a:p>
-          <a:p>
-            <a:br>
-              <a:rPr lang="en-US" dirty="0"/>
-            </a:br>
-            <a:r>
-              <a:rPr lang="en-US" b="1" dirty="0" err="1"/>
-              <a:t>aprun</a:t>
-            </a:r>
-            <a:r>
-              <a:rPr lang="en-US" b="1" dirty="0"/>
-              <a:t> -n 4 ./</a:t>
-            </a:r>
-            <a:r>
-              <a:rPr lang="en-US" b="1" dirty="0" err="1"/>
-              <a:t>test.exe|sort</a:t>
-            </a:r>
-            <a:endParaRPr lang="en-US" dirty="0"/>
-          </a:p>
-          <a:p>
-            <a:endParaRPr lang="en-US" dirty="0"/>
-          </a:p>
-        </p:txBody>
-      </p:sp>
+      </p:pic>
     </p:spTree>
     <p:extLst>
       <p:ext uri="{BB962C8B-B14F-4D97-AF65-F5344CB8AC3E}">
-        <p14:creationId xmlns:p14="http://schemas.microsoft.com/office/powerpoint/2010/main" val="3859322367"/>
+        <p14:creationId xmlns:p14="http://schemas.microsoft.com/office/powerpoint/2010/main" val="2241564996"/>
       </p:ext>
     </p:extLst>
   </p:cSld>

</xml_diff>